<commit_message>
fix some mistakes with qoutes; waiting for command, connected with try-catch slide
</commit_message>
<xml_diff>
--- a/1. First-Steps-in-Coding/1. First-Steps-in-Coding.pptx
+++ b/1. First-Steps-in-Coding/1. First-Steps-in-Coding.pptx
@@ -244,7 +244,7 @@
             <a:fld id="{FE5B4EDC-59C0-49C7-8ADA-5A781B329E02}" type="datetimeFigureOut">
               <a:rPr lang="en-US"/>
               <a:pPr/>
-              <a:t>3/26/2017</a:t>
+              <a:t>3/27/2017</a:t>
             </a:fld>
             <a:endParaRPr dirty="0"/>
           </a:p>
@@ -443,7 +443,7 @@
             <a:fld id="{F2D8D46A-B586-417D-BFBD-8C8FE0AAF762}" type="datetimeFigureOut">
               <a:rPr lang="en-US" smtClean="0"/>
               <a:pPr/>
-              <a:t>3/26/2017</a:t>
+              <a:t>3/27/2017</a:t>
             </a:fld>
             <a:endParaRPr lang="en-US"/>
           </a:p>
@@ -2578,7 +2578,7 @@
             <a:fld id="{055373AC-9AA7-423B-BA00-BA1C74164DBD}" type="datetime1">
               <a:rPr lang="en-US" smtClean="0"/>
               <a:pPr/>
-              <a:t>3/26/2017</a:t>
+              <a:t>3/27/2017</a:t>
             </a:fld>
             <a:endParaRPr lang="en-US" dirty="0"/>
           </a:p>
@@ -3679,7 +3679,7 @@
                 </a:solidFill>
               </a:rPr>
               <a:pPr/>
-              <a:t>3/26/2017</a:t>
+              <a:t>3/27/2017</a:t>
             </a:fld>
             <a:endParaRPr lang="en-US" dirty="0">
               <a:solidFill>
@@ -4855,7 +4855,7 @@
             <a:fld id="{055373AC-9AA7-423B-BA00-BA1C74164DBD}" type="datetime1">
               <a:rPr lang="en-US" smtClean="0"/>
               <a:pPr/>
-              <a:t>3/26/2017</a:t>
+              <a:t>3/27/2017</a:t>
             </a:fld>
             <a:endParaRPr lang="en-US" dirty="0"/>
           </a:p>
@@ -5473,7 +5473,7 @@
                 </a:solidFill>
               </a:rPr>
               <a:pPr/>
-              <a:t>3/26/2017</a:t>
+              <a:t>3/27/2017</a:t>
             </a:fld>
             <a:endParaRPr lang="en-US" dirty="0">
               <a:solidFill>
@@ -7010,7 +7010,7 @@
                 <a:latin typeface="Consolas" pitchFamily="49" charset="0"/>
                 <a:cs typeface="Consolas" pitchFamily="49" charset="0"/>
               </a:rPr>
-              <a:t>	cout &lt;&lt; ”Hello, C++\n”;</a:t>
+              <a:t>	cout &lt;&lt; "Hello, C++\n";</a:t>
             </a:r>
           </a:p>
           <a:p>
@@ -7965,7 +7965,7 @@
                 <a:latin typeface="Consolas" pitchFamily="49" charset="0"/>
                 <a:cs typeface="Consolas" pitchFamily="49" charset="0"/>
               </a:rPr>
-              <a:t>cout &lt;&lt; “Hello”;</a:t>
+              <a:t>cout &lt;&lt; "Hello";</a:t>
             </a:r>
           </a:p>
         </p:txBody>
@@ -10100,7 +10100,7 @@
                 <a:latin typeface="Consolas" pitchFamily="49" charset="0"/>
                 <a:cs typeface="Consolas" pitchFamily="49" charset="0"/>
               </a:rPr>
-              <a:t>	cout &lt;&lt; ”Hello, C++\n”;</a:t>
+              <a:t>	cout &lt;&lt; "Hello, C++\n";</a:t>
             </a:r>
           </a:p>
           <a:p>

</xml_diff>

<commit_message>
fix more wrong things
</commit_message>
<xml_diff>
--- a/1. First-Steps-in-Coding/1. First-Steps-in-Coding.pptx
+++ b/1. First-Steps-in-Coding/1. First-Steps-in-Coding.pptx
@@ -244,7 +244,7 @@
             <a:fld id="{FE5B4EDC-59C0-49C7-8ADA-5A781B329E02}" type="datetimeFigureOut">
               <a:rPr lang="en-US"/>
               <a:pPr/>
-              <a:t>3/27/2017</a:t>
+              <a:t>3/29/2017</a:t>
             </a:fld>
             <a:endParaRPr dirty="0"/>
           </a:p>
@@ -443,7 +443,7 @@
             <a:fld id="{F2D8D46A-B586-417D-BFBD-8C8FE0AAF762}" type="datetimeFigureOut">
               <a:rPr lang="en-US" smtClean="0"/>
               <a:pPr/>
-              <a:t>3/27/2017</a:t>
+              <a:t>3/29/2017</a:t>
             </a:fld>
             <a:endParaRPr lang="en-US"/>
           </a:p>
@@ -2578,7 +2578,7 @@
             <a:fld id="{055373AC-9AA7-423B-BA00-BA1C74164DBD}" type="datetime1">
               <a:rPr lang="en-US" smtClean="0"/>
               <a:pPr/>
-              <a:t>3/27/2017</a:t>
+              <a:t>3/29/2017</a:t>
             </a:fld>
             <a:endParaRPr lang="en-US" dirty="0"/>
           </a:p>
@@ -3679,7 +3679,7 @@
                 </a:solidFill>
               </a:rPr>
               <a:pPr/>
-              <a:t>3/27/2017</a:t>
+              <a:t>3/29/2017</a:t>
             </a:fld>
             <a:endParaRPr lang="en-US" dirty="0">
               <a:solidFill>
@@ -4855,7 +4855,7 @@
             <a:fld id="{055373AC-9AA7-423B-BA00-BA1C74164DBD}" type="datetime1">
               <a:rPr lang="en-US" smtClean="0"/>
               <a:pPr/>
-              <a:t>3/27/2017</a:t>
+              <a:t>3/29/2017</a:t>
             </a:fld>
             <a:endParaRPr lang="en-US" dirty="0"/>
           </a:p>
@@ -5473,7 +5473,7 @@
                 </a:solidFill>
               </a:rPr>
               <a:pPr/>
-              <a:t>3/27/2017</a:t>
+              <a:t>3/29/2017</a:t>
             </a:fld>
             <a:endParaRPr lang="en-US" dirty="0">
               <a:solidFill>
@@ -9190,7 +9190,7 @@
             </a:r>
             <a:r>
               <a:rPr lang="en-US" dirty="0"/>
-              <a:t>Python </a:t>
+              <a:t>C++ </a:t>
             </a:r>
             <a:r>
               <a:rPr lang="bg-BG" dirty="0"/>
@@ -10783,6 +10783,32 @@
                 <a:hlinkClick r:id="rId2"/>
               </a:rPr>
               <a:t>http://www.codeblocks.org/downloads/26</a:t>
+            </a:r>
+            <a:endParaRPr lang="en-US" dirty="0"/>
+          </a:p>
+          <a:p>
+            <a:pPr marL="0" indent="0">
+              <a:buNone/>
+            </a:pPr>
+            <a:r>
+              <a:rPr lang="bg-BG" dirty="0"/>
+              <a:t>Важно е да изтеглите версия на </a:t>
+            </a:r>
+            <a:r>
+              <a:rPr lang="en-US" dirty="0"/>
+              <a:t>Code::Blocks </a:t>
+            </a:r>
+            <a:r>
+              <a:rPr lang="bg-BG" dirty="0"/>
+              <a:t>с включен </a:t>
+            </a:r>
+            <a:r>
+              <a:rPr lang="en-US" dirty="0" err="1"/>
+              <a:t>MinGW</a:t>
+            </a:r>
+            <a:r>
+              <a:rPr lang="bg-BG"/>
+              <a:t> компилатор!</a:t>
             </a:r>
             <a:endParaRPr lang="en-US" dirty="0"/>
           </a:p>

</xml_diff>

<commit_message>
Many small bug fixes + formatting improvements
</commit_message>
<xml_diff>
--- a/1. First-Steps-in-Coding/1. First-Steps-in-Coding.pptx
+++ b/1. First-Steps-in-Coding/1. First-Steps-in-Coding.pptx
@@ -244,7 +244,7 @@
             <a:fld id="{FE5B4EDC-59C0-49C7-8ADA-5A781B329E02}" type="datetimeFigureOut">
               <a:rPr lang="en-US"/>
               <a:pPr/>
-              <a:t>3/29/2017</a:t>
+              <a:t>06-Apr-17</a:t>
             </a:fld>
             <a:endParaRPr dirty="0"/>
           </a:p>
@@ -443,7 +443,7 @@
             <a:fld id="{F2D8D46A-B586-417D-BFBD-8C8FE0AAF762}" type="datetimeFigureOut">
               <a:rPr lang="en-US" smtClean="0"/>
               <a:pPr/>
-              <a:t>3/29/2017</a:t>
+              <a:t>06-Apr-17</a:t>
             </a:fld>
             <a:endParaRPr lang="en-US"/>
           </a:p>
@@ -2578,7 +2578,7 @@
             <a:fld id="{055373AC-9AA7-423B-BA00-BA1C74164DBD}" type="datetime1">
               <a:rPr lang="en-US" smtClean="0"/>
               <a:pPr/>
-              <a:t>3/29/2017</a:t>
+              <a:t>06-Apr-17</a:t>
             </a:fld>
             <a:endParaRPr lang="en-US" dirty="0"/>
           </a:p>
@@ -3679,7 +3679,7 @@
                 </a:solidFill>
               </a:rPr>
               <a:pPr/>
-              <a:t>3/29/2017</a:t>
+              <a:t>06-Apr-17</a:t>
             </a:fld>
             <a:endParaRPr lang="en-US" dirty="0">
               <a:solidFill>
@@ -4855,7 +4855,7 @@
             <a:fld id="{055373AC-9AA7-423B-BA00-BA1C74164DBD}" type="datetime1">
               <a:rPr lang="en-US" smtClean="0"/>
               <a:pPr/>
-              <a:t>3/29/2017</a:t>
+              <a:t>06-Apr-17</a:t>
             </a:fld>
             <a:endParaRPr lang="en-US" dirty="0"/>
           </a:p>
@@ -5473,7 +5473,7 @@
                 </a:solidFill>
               </a:rPr>
               <a:pPr/>
-              <a:t>3/29/2017</a:t>
+              <a:t>06-Apr-17</a:t>
             </a:fld>
             <a:endParaRPr lang="en-US" dirty="0">
               <a:solidFill>
@@ -6417,7 +6417,7 @@
         </p:nvSpPr>
         <p:spPr>
           <a:xfrm rot="576164">
-            <a:off x="4765524" y="3618778"/>
+            <a:off x="4765524" y="3557131"/>
             <a:ext cx="2510495" cy="722955"/>
           </a:xfrm>
           <a:prstGeom prst="rect">
@@ -6646,8 +6646,8 @@
         </p:blipFill>
         <p:spPr>
           <a:xfrm>
-            <a:off x="4341812" y="1828800"/>
-            <a:ext cx="7353764" cy="4239002"/>
+            <a:off x="3960812" y="1609176"/>
+            <a:ext cx="7734764" cy="4458626"/>
           </a:xfrm>
           <a:prstGeom prst="rect">
             <a:avLst/>
@@ -6780,7 +6780,7 @@
         <p:spPr bwMode="auto">
           <a:xfrm>
             <a:off x="681036" y="2079852"/>
-            <a:ext cx="10823576" cy="3693319"/>
+            <a:ext cx="10823576" cy="3970318"/>
           </a:xfrm>
           <a:prstGeom prst="rect">
             <a:avLst/>
@@ -6817,7 +6817,7 @@
               <a:buSzPct val="70000"/>
             </a:pPr>
             <a:r>
-              <a:rPr lang="sv-SE" sz="2600" b="1" noProof="1">
+              <a:rPr lang="sv-SE" sz="2800" b="1" noProof="1">
                 <a:solidFill>
                   <a:srgbClr val="FBEEDC"/>
                 </a:solidFill>
@@ -6844,7 +6844,7 @@
               </a:buClr>
               <a:buSzPct val="70000"/>
             </a:pPr>
-            <a:endParaRPr lang="sv-SE" sz="2600" b="1" noProof="1">
+            <a:endParaRPr lang="sv-SE" sz="2800" b="1" noProof="1">
               <a:solidFill>
                 <a:srgbClr val="FBEEDC"/>
               </a:solidFill>
@@ -6870,7 +6870,7 @@
               <a:buSzPct val="70000"/>
             </a:pPr>
             <a:r>
-              <a:rPr lang="en-US" sz="2600" b="1" noProof="1">
+              <a:rPr lang="en-US" sz="2800" b="1" noProof="1">
                 <a:solidFill>
                   <a:srgbClr val="FBEEDC"/>
                 </a:solidFill>
@@ -6887,7 +6887,7 @@
               <a:t>u</a:t>
             </a:r>
             <a:r>
-              <a:rPr lang="sv-SE" sz="2600" b="1" noProof="1">
+              <a:rPr lang="sv-SE" sz="2800" b="1" noProof="1">
                 <a:solidFill>
                   <a:srgbClr val="FBEEDC"/>
                 </a:solidFill>
@@ -6914,7 +6914,7 @@
               </a:buClr>
               <a:buSzPct val="70000"/>
             </a:pPr>
-            <a:endParaRPr lang="sv-SE" sz="2600" b="1" noProof="1">
+            <a:endParaRPr lang="sv-SE" sz="2800" b="1" noProof="1">
               <a:solidFill>
                 <a:srgbClr val="FBEEDC"/>
               </a:solidFill>
@@ -6940,7 +6940,7 @@
               <a:buSzPct val="70000"/>
             </a:pPr>
             <a:r>
-              <a:rPr lang="sv-SE" sz="2600" b="1" noProof="1">
+              <a:rPr lang="sv-SE" sz="2800" b="1" noProof="1">
                 <a:solidFill>
                   <a:srgbClr val="FBEEDC"/>
                 </a:solidFill>
@@ -6968,7 +6968,7 @@
               <a:buSzPct val="70000"/>
             </a:pPr>
             <a:r>
-              <a:rPr lang="sv-SE" sz="2600" b="1" noProof="1">
+              <a:rPr lang="sv-SE" sz="2800" b="1" noProof="1">
                 <a:solidFill>
                   <a:srgbClr val="FBEEDC"/>
                 </a:solidFill>
@@ -6996,7 +6996,7 @@
               <a:buSzPct val="70000"/>
             </a:pPr>
             <a:r>
-              <a:rPr lang="sv-SE" sz="2600" b="1" noProof="1">
+              <a:rPr lang="sv-SE" sz="2800" b="1" noProof="1">
                 <a:solidFill>
                   <a:srgbClr val="FBEEDC"/>
                 </a:solidFill>
@@ -7010,7 +7010,7 @@
                 <a:latin typeface="Consolas" pitchFamily="49" charset="0"/>
                 <a:cs typeface="Consolas" pitchFamily="49" charset="0"/>
               </a:rPr>
-              <a:t>	cout &lt;&lt; "Hello, C++\n";</a:t>
+              <a:t>  cout &lt;&lt; "Hello, C++\n";</a:t>
             </a:r>
           </a:p>
           <a:p>
@@ -7024,7 +7024,7 @@
               <a:buSzPct val="70000"/>
             </a:pPr>
             <a:r>
-              <a:rPr lang="sv-SE" sz="2600" b="1" noProof="1">
+              <a:rPr lang="sv-SE" sz="2800" b="1" noProof="1">
                 <a:solidFill>
                   <a:srgbClr val="FBEEDC"/>
                 </a:solidFill>
@@ -7038,7 +7038,7 @@
                 <a:latin typeface="Consolas" pitchFamily="49" charset="0"/>
                 <a:cs typeface="Consolas" pitchFamily="49" charset="0"/>
               </a:rPr>
-              <a:t>	return 0;</a:t>
+              <a:t>  return 0;</a:t>
             </a:r>
           </a:p>
           <a:p>
@@ -7052,7 +7052,7 @@
               <a:buSzPct val="70000"/>
             </a:pPr>
             <a:r>
-              <a:rPr lang="sv-SE" sz="2600" b="1" noProof="1">
+              <a:rPr lang="sv-SE" sz="2800" b="1" noProof="1">
                 <a:solidFill>
                   <a:srgbClr val="FBEEDC"/>
                 </a:solidFill>
@@ -7068,7 +7068,7 @@
               </a:rPr>
               <a:t>}</a:t>
             </a:r>
-            <a:endParaRPr lang="en-US" sz="2600" b="1" noProof="1">
+            <a:endParaRPr lang="en-US" sz="2800" b="1" noProof="1">
               <a:solidFill>
                 <a:srgbClr val="FBEEDC"/>
               </a:solidFill>
@@ -7217,8 +7217,8 @@
         </p:blipFill>
         <p:spPr>
           <a:xfrm>
-            <a:off x="3351212" y="2895600"/>
-            <a:ext cx="5223368" cy="2897703"/>
+            <a:off x="2802758" y="2818380"/>
+            <a:ext cx="6320276" cy="3506220"/>
           </a:xfrm>
           <a:prstGeom prst="rect">
             <a:avLst/>
@@ -7384,8 +7384,8 @@
         </p:blipFill>
         <p:spPr>
           <a:xfrm>
-            <a:off x="2360612" y="2895600"/>
-            <a:ext cx="7221575" cy="2971799"/>
+            <a:off x="1602346" y="2652523"/>
+            <a:ext cx="8738106" cy="3595877"/>
           </a:xfrm>
           <a:prstGeom prst="rect">
             <a:avLst/>
@@ -7438,7 +7438,7 @@
         </p:blipFill>
         <p:spPr>
           <a:xfrm>
-            <a:off x="169630" y="450955"/>
+            <a:off x="417048" y="450955"/>
             <a:ext cx="7353764" cy="4239002"/>
           </a:xfrm>
           <a:prstGeom prst="rect">
@@ -7519,12 +7519,19 @@
         </p:blipFill>
         <p:spPr>
           <a:xfrm>
-            <a:off x="6965457" y="815568"/>
+            <a:off x="6475412" y="1064697"/>
             <a:ext cx="5223368" cy="2897703"/>
           </a:xfrm>
           <a:prstGeom prst="rect">
             <a:avLst/>
           </a:prstGeom>
+          <a:effectLst>
+            <a:outerShdw blurRad="63500" sx="102000" sy="102000" algn="ctr" rotWithShape="0">
+              <a:prstClr val="black">
+                <a:alpha val="40000"/>
+              </a:prstClr>
+            </a:outerShdw>
+          </a:effectLst>
         </p:spPr>
       </p:pic>
       <p:pic>
@@ -7543,17 +7550,23 @@
               </a:ext>
             </a:extLst>
           </a:blip>
-          <a:srcRect/>
           <a:stretch/>
         </p:blipFill>
         <p:spPr>
           <a:xfrm>
-            <a:off x="5561012" y="2345969"/>
-            <a:ext cx="5445147" cy="2507109"/>
+            <a:off x="5180011" y="2286000"/>
+            <a:ext cx="6158136" cy="2290142"/>
           </a:xfrm>
           <a:prstGeom prst="rect">
             <a:avLst/>
           </a:prstGeom>
+          <a:effectLst>
+            <a:outerShdw blurRad="63500" sx="102000" sy="102000" algn="ctr" rotWithShape="0">
+              <a:prstClr val="black">
+                <a:alpha val="40000"/>
+              </a:prstClr>
+            </a:outerShdw>
+          </a:effectLst>
         </p:spPr>
       </p:pic>
     </p:spTree>
@@ -7770,9 +7783,50 @@
             </a:r>
             <a:r>
               <a:rPr lang="bg-BG" sz="3200" dirty="0"/>
-              <a:t>пишат във файла</a:t>
+              <a:t>пишат в</a:t>
+            </a:r>
+            <a:r>
+              <a:rPr lang="en-US" sz="3200" dirty="0"/>
+              <a:t> </a:t>
+            </a:r>
+            <a:r>
+              <a:rPr lang="en-US" sz="3200" b="1" dirty="0">
+                <a:solidFill>
+                  <a:schemeClr val="tx2">
+                    <a:lumMod val="75000"/>
+                  </a:schemeClr>
+                </a:solidFill>
+                <a:latin typeface="Consolas" panose="020B0609020204030204" pitchFamily="49" charset="0"/>
+              </a:rPr>
+              <a:t>main()</a:t>
+            </a:r>
+            <a:r>
+              <a:rPr lang="en-US" sz="3200" dirty="0"/>
+              <a:t> </a:t>
+            </a:r>
+            <a:r>
+              <a:rPr lang="bg-BG" sz="3200" dirty="0"/>
+              <a:t>функцията:</a:t>
             </a:r>
             <a:endParaRPr lang="en-US" sz="3200" dirty="0"/>
+          </a:p>
+          <a:p>
+            <a:pPr marL="377887" lvl="1" indent="0">
+              <a:lnSpc>
+                <a:spcPct val="100000"/>
+              </a:lnSpc>
+              <a:buNone/>
+            </a:pPr>
+            <a:endParaRPr lang="bg-BG" sz="3000" dirty="0"/>
+          </a:p>
+          <a:p>
+            <a:pPr marL="377887" lvl="1" indent="0">
+              <a:lnSpc>
+                <a:spcPct val="100000"/>
+              </a:lnSpc>
+              <a:buNone/>
+            </a:pPr>
+            <a:endParaRPr lang="bg-BG" sz="3000" dirty="0"/>
           </a:p>
           <a:p>
             <a:pPr marL="377887" lvl="1" indent="0">
@@ -7794,27 +7848,18 @@
             </a:pPr>
             <a:r>
               <a:rPr lang="bg-BG" sz="3000" dirty="0"/>
-              <a:t>Печатаме със </a:t>
-            </a:r>
-            <a:r>
-              <a:rPr lang="en-US" sz="3000" dirty="0" err="1">
+              <a:t>Печатаме с </a:t>
+            </a:r>
+            <a:r>
+              <a:rPr lang="en-US" sz="3000" b="1" noProof="1">
                 <a:solidFill>
                   <a:schemeClr val="tx2">
                     <a:lumMod val="75000"/>
                   </a:schemeClr>
                 </a:solidFill>
+                <a:latin typeface="Consolas" panose="020B0609020204030204" pitchFamily="49" charset="0"/>
               </a:rPr>
-              <a:t>cout</a:t>
-            </a:r>
-            <a:r>
-              <a:rPr lang="en-US" sz="3000" dirty="0">
-                <a:solidFill>
-                  <a:schemeClr val="tx2">
-                    <a:lumMod val="75000"/>
-                  </a:schemeClr>
-                </a:solidFill>
-              </a:rPr>
-              <a:t> &lt;&lt; ...</a:t>
+              <a:t>cout &lt;&lt; …</a:t>
             </a:r>
             <a:r>
               <a:rPr lang="en-US" sz="3000" dirty="0"/>
@@ -7885,7 +7930,7 @@
         </p:blipFill>
         <p:spPr bwMode="auto">
           <a:xfrm>
-            <a:off x="8748124" y="3495297"/>
+            <a:off x="8895390" y="4343400"/>
             <a:ext cx="2786628" cy="2067303"/>
           </a:xfrm>
           <a:prstGeom prst="rect">
@@ -7913,8 +7958,8 @@
         </p:nvSpPr>
         <p:spPr bwMode="auto">
           <a:xfrm>
-            <a:off x="933989" y="4258235"/>
-            <a:ext cx="7217824" cy="461665"/>
+            <a:off x="933989" y="4257100"/>
+            <a:ext cx="7217824" cy="1569660"/>
           </a:xfrm>
           <a:prstGeom prst="rect">
             <a:avLst/>
@@ -7965,7 +8010,91 @@
                 <a:latin typeface="Consolas" pitchFamily="49" charset="0"/>
                 <a:cs typeface="Consolas" pitchFamily="49" charset="0"/>
               </a:rPr>
-              <a:t>cout &lt;&lt; "Hello";</a:t>
+              <a:t>int main() {</a:t>
+            </a:r>
+          </a:p>
+          <a:p>
+            <a:pPr eaLnBrk="0" hangingPunct="0">
+              <a:buClr>
+                <a:schemeClr val="accent5">
+                  <a:lumMod val="40000"/>
+                  <a:lumOff val="60000"/>
+                </a:schemeClr>
+              </a:buClr>
+              <a:buSzPct val="70000"/>
+            </a:pPr>
+            <a:r>
+              <a:rPr lang="en-US" b="1" noProof="1">
+                <a:solidFill>
+                  <a:srgbClr val="FBEEDC"/>
+                </a:solidFill>
+                <a:effectLst>
+                  <a:outerShdw blurRad="38100" dist="38100" dir="2700000" algn="tl">
+                    <a:srgbClr val="000000">
+                      <a:alpha val="43137"/>
+                    </a:srgbClr>
+                  </a:outerShdw>
+                </a:effectLst>
+                <a:latin typeface="Consolas" pitchFamily="49" charset="0"/>
+                <a:cs typeface="Consolas" pitchFamily="49" charset="0"/>
+              </a:rPr>
+              <a:t>  cout &lt;&lt; "Hello";</a:t>
+            </a:r>
+          </a:p>
+          <a:p>
+            <a:pPr eaLnBrk="0" hangingPunct="0">
+              <a:buClr>
+                <a:schemeClr val="accent5">
+                  <a:lumMod val="40000"/>
+                  <a:lumOff val="60000"/>
+                </a:schemeClr>
+              </a:buClr>
+              <a:buSzPct val="70000"/>
+            </a:pPr>
+            <a:r>
+              <a:rPr lang="en-US" b="1" noProof="1">
+                <a:solidFill>
+                  <a:srgbClr val="FBEEDC"/>
+                </a:solidFill>
+                <a:effectLst>
+                  <a:outerShdw blurRad="38100" dist="38100" dir="2700000" algn="tl">
+                    <a:srgbClr val="000000">
+                      <a:alpha val="43137"/>
+                    </a:srgbClr>
+                  </a:outerShdw>
+                </a:effectLst>
+                <a:latin typeface="Consolas" pitchFamily="49" charset="0"/>
+                <a:cs typeface="Consolas" pitchFamily="49" charset="0"/>
+              </a:rPr>
+              <a:t>  return 0;</a:t>
+            </a:r>
+          </a:p>
+          <a:p>
+            <a:pPr eaLnBrk="0" hangingPunct="0">
+              <a:buClr>
+                <a:schemeClr val="accent5">
+                  <a:lumMod val="40000"/>
+                  <a:lumOff val="60000"/>
+                </a:schemeClr>
+              </a:buClr>
+              <a:buSzPct val="70000"/>
+            </a:pPr>
+            <a:r>
+              <a:rPr lang="en-US" b="1" noProof="1">
+                <a:solidFill>
+                  <a:srgbClr val="FBEEDC"/>
+                </a:solidFill>
+                <a:effectLst>
+                  <a:outerShdw blurRad="38100" dist="38100" dir="2700000" algn="tl">
+                    <a:srgbClr val="000000">
+                      <a:alpha val="43137"/>
+                    </a:srgbClr>
+                  </a:outerShdw>
+                </a:effectLst>
+                <a:latin typeface="Consolas" pitchFamily="49" charset="0"/>
+                <a:cs typeface="Consolas" pitchFamily="49" charset="0"/>
+              </a:rPr>
+              <a:t>}</a:t>
             </a:r>
           </a:p>
         </p:txBody>
@@ -7980,6 +8109,146 @@
   <p:clrMapOvr>
     <a:masterClrMapping/>
   </p:clrMapOvr>
+  <p:timing>
+    <p:tnLst>
+      <p:par>
+        <p:cTn id="1" dur="indefinite" restart="never" nodeType="tmRoot">
+          <p:childTnLst>
+            <p:seq concurrent="1" nextAc="seek">
+              <p:cTn id="2" dur="indefinite" nodeType="mainSeq">
+                <p:childTnLst>
+                  <p:par>
+                    <p:cTn id="3" fill="hold">
+                      <p:stCondLst>
+                        <p:cond delay="indefinite"/>
+                      </p:stCondLst>
+                      <p:childTnLst>
+                        <p:par>
+                          <p:cTn id="4" fill="hold">
+                            <p:stCondLst>
+                              <p:cond delay="0"/>
+                            </p:stCondLst>
+                            <p:childTnLst>
+                              <p:par>
+                                <p:cTn id="5" presetID="1" presetClass="entr" presetSubtype="0" fill="hold" nodeType="clickEffect">
+                                  <p:stCondLst>
+                                    <p:cond delay="0"/>
+                                  </p:stCondLst>
+                                  <p:childTnLst>
+                                    <p:set>
+                                      <p:cBhvr>
+                                        <p:cTn id="6" dur="1" fill="hold">
+                                          <p:stCondLst>
+                                            <p:cond delay="0"/>
+                                          </p:stCondLst>
+                                        </p:cTn>
+                                        <p:tgtEl>
+                                          <p:spTgt spid="5">
+                                            <p:txEl>
+                                              <p:pRg st="3" end="3"/>
+                                            </p:txEl>
+                                          </p:spTgt>
+                                        </p:tgtEl>
+                                        <p:attrNameLst>
+                                          <p:attrName>style.visibility</p:attrName>
+                                        </p:attrNameLst>
+                                      </p:cBhvr>
+                                      <p:to>
+                                        <p:strVal val="visible"/>
+                                      </p:to>
+                                    </p:set>
+                                  </p:childTnLst>
+                                </p:cTn>
+                              </p:par>
+                              <p:par>
+                                <p:cTn id="7" presetID="1" presetClass="entr" presetSubtype="0" fill="hold" nodeType="withEffect">
+                                  <p:stCondLst>
+                                    <p:cond delay="0"/>
+                                  </p:stCondLst>
+                                  <p:childTnLst>
+                                    <p:set>
+                                      <p:cBhvr>
+                                        <p:cTn id="8" dur="1" fill="hold">
+                                          <p:stCondLst>
+                                            <p:cond delay="0"/>
+                                          </p:stCondLst>
+                                        </p:cTn>
+                                        <p:tgtEl>
+                                          <p:spTgt spid="5">
+                                            <p:txEl>
+                                              <p:pRg st="7" end="7"/>
+                                            </p:txEl>
+                                          </p:spTgt>
+                                        </p:tgtEl>
+                                        <p:attrNameLst>
+                                          <p:attrName>style.visibility</p:attrName>
+                                        </p:attrNameLst>
+                                      </p:cBhvr>
+                                      <p:to>
+                                        <p:strVal val="visible"/>
+                                      </p:to>
+                                    </p:set>
+                                  </p:childTnLst>
+                                </p:cTn>
+                              </p:par>
+                              <p:par>
+                                <p:cTn id="9" presetID="1" presetClass="entr" presetSubtype="0" fill="hold" grpId="0" nodeType="withEffect">
+                                  <p:stCondLst>
+                                    <p:cond delay="0"/>
+                                  </p:stCondLst>
+                                  <p:childTnLst>
+                                    <p:set>
+                                      <p:cBhvr>
+                                        <p:cTn id="10" dur="1" fill="hold">
+                                          <p:stCondLst>
+                                            <p:cond delay="0"/>
+                                          </p:stCondLst>
+                                        </p:cTn>
+                                        <p:tgtEl>
+                                          <p:spTgt spid="8"/>
+                                        </p:tgtEl>
+                                        <p:attrNameLst>
+                                          <p:attrName>style.visibility</p:attrName>
+                                        </p:attrNameLst>
+                                      </p:cBhvr>
+                                      <p:to>
+                                        <p:strVal val="visible"/>
+                                      </p:to>
+                                    </p:set>
+                                  </p:childTnLst>
+                                </p:cTn>
+                              </p:par>
+                            </p:childTnLst>
+                          </p:cTn>
+                        </p:par>
+                      </p:childTnLst>
+                    </p:cTn>
+                  </p:par>
+                </p:childTnLst>
+              </p:cTn>
+              <p:prevCondLst>
+                <p:cond evt="onPrev" delay="0">
+                  <p:tgtEl>
+                    <p:sldTgt/>
+                  </p:tgtEl>
+                </p:cond>
+              </p:prevCondLst>
+              <p:nextCondLst>
+                <p:cond evt="onNext" delay="0">
+                  <p:tgtEl>
+                    <p:sldTgt/>
+                  </p:tgtEl>
+                </p:cond>
+              </p:nextCondLst>
+            </p:seq>
+          </p:childTnLst>
+        </p:cTn>
+      </p:par>
+    </p:tnLst>
+    <p:bldLst>
+      <p:bldP spid="8" grpId="0" animBg="1"/>
+    </p:bldLst>
+  </p:timing>
 </p:sld>
 </file>
 
@@ -8554,8 +8823,8 @@
         </p:blipFill>
         <p:spPr bwMode="auto">
           <a:xfrm>
-            <a:off x="4507637" y="3462620"/>
-            <a:ext cx="3170776" cy="1109380"/>
+            <a:off x="3982874" y="4009815"/>
+            <a:ext cx="4220303" cy="1476585"/>
           </a:xfrm>
           <a:prstGeom prst="roundRect">
             <a:avLst>
@@ -9285,6 +9554,227 @@
   <p:clrMapOvr>
     <a:masterClrMapping/>
   </p:clrMapOvr>
+  <p:timing>
+    <p:tnLst>
+      <p:par>
+        <p:cTn id="1" dur="indefinite" restart="never" nodeType="tmRoot">
+          <p:childTnLst>
+            <p:seq concurrent="1" nextAc="seek">
+              <p:cTn id="2" dur="indefinite" nodeType="mainSeq">
+                <p:childTnLst>
+                  <p:par>
+                    <p:cTn id="3" fill="hold">
+                      <p:stCondLst>
+                        <p:cond delay="indefinite"/>
+                      </p:stCondLst>
+                      <p:childTnLst>
+                        <p:par>
+                          <p:cTn id="4" fill="hold">
+                            <p:stCondLst>
+                              <p:cond delay="0"/>
+                            </p:stCondLst>
+                            <p:childTnLst>
+                              <p:par>
+                                <p:cTn id="5" presetID="1" presetClass="entr" presetSubtype="0" fill="hold" nodeType="clickEffect">
+                                  <p:stCondLst>
+                                    <p:cond delay="0"/>
+                                  </p:stCondLst>
+                                  <p:childTnLst>
+                                    <p:set>
+                                      <p:cBhvr>
+                                        <p:cTn id="6" dur="1" fill="hold">
+                                          <p:stCondLst>
+                                            <p:cond delay="0"/>
+                                          </p:stCondLst>
+                                        </p:cTn>
+                                        <p:tgtEl>
+                                          <p:spTgt spid="444419">
+                                            <p:txEl>
+                                              <p:pRg st="1" end="1"/>
+                                            </p:txEl>
+                                          </p:spTgt>
+                                        </p:tgtEl>
+                                        <p:attrNameLst>
+                                          <p:attrName>style.visibility</p:attrName>
+                                        </p:attrNameLst>
+                                      </p:cBhvr>
+                                      <p:to>
+                                        <p:strVal val="visible"/>
+                                      </p:to>
+                                    </p:set>
+                                  </p:childTnLst>
+                                </p:cTn>
+                              </p:par>
+                            </p:childTnLst>
+                          </p:cTn>
+                        </p:par>
+                      </p:childTnLst>
+                    </p:cTn>
+                  </p:par>
+                  <p:par>
+                    <p:cTn id="7" fill="hold">
+                      <p:stCondLst>
+                        <p:cond delay="indefinite"/>
+                      </p:stCondLst>
+                      <p:childTnLst>
+                        <p:par>
+                          <p:cTn id="8" fill="hold">
+                            <p:stCondLst>
+                              <p:cond delay="0"/>
+                            </p:stCondLst>
+                            <p:childTnLst>
+                              <p:par>
+                                <p:cTn id="9" presetID="1" presetClass="entr" presetSubtype="0" fill="hold" nodeType="clickEffect">
+                                  <p:stCondLst>
+                                    <p:cond delay="0"/>
+                                  </p:stCondLst>
+                                  <p:childTnLst>
+                                    <p:set>
+                                      <p:cBhvr>
+                                        <p:cTn id="10" dur="1" fill="hold">
+                                          <p:stCondLst>
+                                            <p:cond delay="0"/>
+                                          </p:stCondLst>
+                                        </p:cTn>
+                                        <p:tgtEl>
+                                          <p:spTgt spid="444419">
+                                            <p:txEl>
+                                              <p:pRg st="2" end="2"/>
+                                            </p:txEl>
+                                          </p:spTgt>
+                                        </p:tgtEl>
+                                        <p:attrNameLst>
+                                          <p:attrName>style.visibility</p:attrName>
+                                        </p:attrNameLst>
+                                      </p:cBhvr>
+                                      <p:to>
+                                        <p:strVal val="visible"/>
+                                      </p:to>
+                                    </p:set>
+                                  </p:childTnLst>
+                                </p:cTn>
+                              </p:par>
+                              <p:par>
+                                <p:cTn id="11" presetID="1" presetClass="entr" presetSubtype="0" fill="hold" nodeType="withEffect">
+                                  <p:stCondLst>
+                                    <p:cond delay="0"/>
+                                  </p:stCondLst>
+                                  <p:childTnLst>
+                                    <p:set>
+                                      <p:cBhvr>
+                                        <p:cTn id="12" dur="1" fill="hold">
+                                          <p:stCondLst>
+                                            <p:cond delay="0"/>
+                                          </p:stCondLst>
+                                        </p:cTn>
+                                        <p:tgtEl>
+                                          <p:spTgt spid="444419">
+                                            <p:txEl>
+                                              <p:pRg st="3" end="3"/>
+                                            </p:txEl>
+                                          </p:spTgt>
+                                        </p:tgtEl>
+                                        <p:attrNameLst>
+                                          <p:attrName>style.visibility</p:attrName>
+                                        </p:attrNameLst>
+                                      </p:cBhvr>
+                                      <p:to>
+                                        <p:strVal val="visible"/>
+                                      </p:to>
+                                    </p:set>
+                                  </p:childTnLst>
+                                </p:cTn>
+                              </p:par>
+                              <p:par>
+                                <p:cTn id="13" presetID="1" presetClass="entr" presetSubtype="0" fill="hold" nodeType="withEffect">
+                                  <p:stCondLst>
+                                    <p:cond delay="0"/>
+                                  </p:stCondLst>
+                                  <p:childTnLst>
+                                    <p:set>
+                                      <p:cBhvr>
+                                        <p:cTn id="14" dur="1" fill="hold">
+                                          <p:stCondLst>
+                                            <p:cond delay="0"/>
+                                          </p:stCondLst>
+                                        </p:cTn>
+                                        <p:tgtEl>
+                                          <p:spTgt spid="444419">
+                                            <p:txEl>
+                                              <p:pRg st="4" end="4"/>
+                                            </p:txEl>
+                                          </p:spTgt>
+                                        </p:tgtEl>
+                                        <p:attrNameLst>
+                                          <p:attrName>style.visibility</p:attrName>
+                                        </p:attrNameLst>
+                                      </p:cBhvr>
+                                      <p:to>
+                                        <p:strVal val="visible"/>
+                                      </p:to>
+                                    </p:set>
+                                  </p:childTnLst>
+                                </p:cTn>
+                              </p:par>
+                              <p:par>
+                                <p:cTn id="15" presetID="1" presetClass="entr" presetSubtype="0" fill="hold" nodeType="withEffect">
+                                  <p:stCondLst>
+                                    <p:cond delay="0"/>
+                                  </p:stCondLst>
+                                  <p:childTnLst>
+                                    <p:set>
+                                      <p:cBhvr>
+                                        <p:cTn id="16" dur="1" fill="hold">
+                                          <p:stCondLst>
+                                            <p:cond delay="0"/>
+                                          </p:stCondLst>
+                                        </p:cTn>
+                                        <p:tgtEl>
+                                          <p:spTgt spid="444419">
+                                            <p:txEl>
+                                              <p:pRg st="5" end="5"/>
+                                            </p:txEl>
+                                          </p:spTgt>
+                                        </p:tgtEl>
+                                        <p:attrNameLst>
+                                          <p:attrName>style.visibility</p:attrName>
+                                        </p:attrNameLst>
+                                      </p:cBhvr>
+                                      <p:to>
+                                        <p:strVal val="visible"/>
+                                      </p:to>
+                                    </p:set>
+                                  </p:childTnLst>
+                                </p:cTn>
+                              </p:par>
+                            </p:childTnLst>
+                          </p:cTn>
+                        </p:par>
+                      </p:childTnLst>
+                    </p:cTn>
+                  </p:par>
+                </p:childTnLst>
+              </p:cTn>
+              <p:prevCondLst>
+                <p:cond evt="onPrev" delay="0">
+                  <p:tgtEl>
+                    <p:sldTgt/>
+                  </p:tgtEl>
+                </p:cond>
+              </p:prevCondLst>
+              <p:nextCondLst>
+                <p:cond evt="onNext" delay="0">
+                  <p:tgtEl>
+                    <p:sldTgt/>
+                  </p:tgtEl>
+                </p:cond>
+              </p:nextCondLst>
+            </p:seq>
+          </p:childTnLst>
+        </p:cTn>
+      </p:par>
+    </p:tnLst>
+  </p:timing>
 </p:sld>
 </file>
 
@@ -9804,7 +10294,23 @@
           <a:p>
             <a:r>
               <a:rPr lang="bg-BG" sz="3200" dirty="0"/>
-              <a:t>Програма, която печата текст </a:t>
+              <a:t>Програма</a:t>
+            </a:r>
+            <a:r>
+              <a:rPr lang="en-US" sz="3200" dirty="0"/>
+              <a:t> </a:t>
+            </a:r>
+            <a:r>
+              <a:rPr lang="bg-BG" sz="3200" dirty="0"/>
+              <a:t>на </a:t>
+            </a:r>
+            <a:r>
+              <a:rPr lang="en-US" sz="3200" dirty="0"/>
+              <a:t>C++</a:t>
+            </a:r>
+            <a:r>
+              <a:rPr lang="bg-BG" sz="3200" dirty="0"/>
+              <a:t>, която печата текст </a:t>
             </a:r>
           </a:p>
           <a:p>
@@ -9870,7 +10376,7 @@
         <p:spPr bwMode="auto">
           <a:xfrm>
             <a:off x="681036" y="2079852"/>
-            <a:ext cx="10823576" cy="3693319"/>
+            <a:ext cx="10823576" cy="3970318"/>
           </a:xfrm>
           <a:prstGeom prst="rect">
             <a:avLst/>
@@ -9907,7 +10413,7 @@
               <a:buSzPct val="70000"/>
             </a:pPr>
             <a:r>
-              <a:rPr lang="sv-SE" sz="2600" b="1" noProof="1">
+              <a:rPr lang="sv-SE" sz="2800" b="1" noProof="1">
                 <a:solidFill>
                   <a:srgbClr val="FBEEDC"/>
                 </a:solidFill>
@@ -9934,7 +10440,7 @@
               </a:buClr>
               <a:buSzPct val="70000"/>
             </a:pPr>
-            <a:endParaRPr lang="sv-SE" sz="2600" b="1" noProof="1">
+            <a:endParaRPr lang="sv-SE" sz="2800" b="1" noProof="1">
               <a:solidFill>
                 <a:srgbClr val="FBEEDC"/>
               </a:solidFill>
@@ -9960,7 +10466,7 @@
               <a:buSzPct val="70000"/>
             </a:pPr>
             <a:r>
-              <a:rPr lang="en-US" sz="2600" b="1" noProof="1">
+              <a:rPr lang="en-US" sz="2800" b="1" noProof="1">
                 <a:solidFill>
                   <a:srgbClr val="FBEEDC"/>
                 </a:solidFill>
@@ -9977,7 +10483,7 @@
               <a:t>u</a:t>
             </a:r>
             <a:r>
-              <a:rPr lang="sv-SE" sz="2600" b="1" noProof="1">
+              <a:rPr lang="sv-SE" sz="2800" b="1" noProof="1">
                 <a:solidFill>
                   <a:srgbClr val="FBEEDC"/>
                 </a:solidFill>
@@ -10004,7 +10510,7 @@
               </a:buClr>
               <a:buSzPct val="70000"/>
             </a:pPr>
-            <a:endParaRPr lang="sv-SE" sz="2600" b="1" noProof="1">
+            <a:endParaRPr lang="sv-SE" sz="2800" b="1" noProof="1">
               <a:solidFill>
                 <a:srgbClr val="FBEEDC"/>
               </a:solidFill>
@@ -10030,7 +10536,7 @@
               <a:buSzPct val="70000"/>
             </a:pPr>
             <a:r>
-              <a:rPr lang="sv-SE" sz="2600" b="1" noProof="1">
+              <a:rPr lang="sv-SE" sz="2800" b="1" noProof="1">
                 <a:solidFill>
                   <a:srgbClr val="FBEEDC"/>
                 </a:solidFill>
@@ -10058,7 +10564,7 @@
               <a:buSzPct val="70000"/>
             </a:pPr>
             <a:r>
-              <a:rPr lang="sv-SE" sz="2600" b="1" noProof="1">
+              <a:rPr lang="sv-SE" sz="2800" b="1" noProof="1">
                 <a:solidFill>
                   <a:srgbClr val="FBEEDC"/>
                 </a:solidFill>
@@ -10086,7 +10592,7 @@
               <a:buSzPct val="70000"/>
             </a:pPr>
             <a:r>
-              <a:rPr lang="sv-SE" sz="2600" b="1" noProof="1">
+              <a:rPr lang="sv-SE" sz="2800" b="1" noProof="1">
                 <a:solidFill>
                   <a:srgbClr val="FBEEDC"/>
                 </a:solidFill>
@@ -10100,7 +10606,7 @@
                 <a:latin typeface="Consolas" pitchFamily="49" charset="0"/>
                 <a:cs typeface="Consolas" pitchFamily="49" charset="0"/>
               </a:rPr>
-              <a:t>	cout &lt;&lt; "Hello, C++\n";</a:t>
+              <a:t>  cout &lt;&lt; "Hello, C++\n";</a:t>
             </a:r>
           </a:p>
           <a:p>
@@ -10114,7 +10620,7 @@
               <a:buSzPct val="70000"/>
             </a:pPr>
             <a:r>
-              <a:rPr lang="sv-SE" sz="2600" b="1" noProof="1">
+              <a:rPr lang="sv-SE" sz="2800" b="1" noProof="1">
                 <a:solidFill>
                   <a:srgbClr val="FBEEDC"/>
                 </a:solidFill>
@@ -10128,7 +10634,7 @@
                 <a:latin typeface="Consolas" pitchFamily="49" charset="0"/>
                 <a:cs typeface="Consolas" pitchFamily="49" charset="0"/>
               </a:rPr>
-              <a:t>	return 0;</a:t>
+              <a:t>  return 0;</a:t>
             </a:r>
           </a:p>
           <a:p>
@@ -10142,7 +10648,7 @@
               <a:buSzPct val="70000"/>
             </a:pPr>
             <a:r>
-              <a:rPr lang="sv-SE" sz="2600" b="1" noProof="1">
+              <a:rPr lang="sv-SE" sz="2800" b="1" noProof="1">
                 <a:solidFill>
                   <a:srgbClr val="FBEEDC"/>
                 </a:solidFill>
@@ -10158,7 +10664,7 @@
               </a:rPr>
               <a:t>}</a:t>
             </a:r>
-            <a:endParaRPr lang="en-US" sz="2600" b="1" noProof="1">
+            <a:endParaRPr lang="en-US" sz="2800" b="1" noProof="1">
               <a:solidFill>
                 <a:srgbClr val="FBEEDC"/>
               </a:solidFill>
@@ -10375,15 +10881,33 @@
               <a:t> </a:t>
             </a:r>
             <a:r>
+              <a:rPr lang="en-US" b="1" dirty="0">
+                <a:solidFill>
+                  <a:schemeClr val="tx2">
+                    <a:lumMod val="75000"/>
+                  </a:schemeClr>
+                </a:solidFill>
+                <a:latin typeface="Consolas" panose="020B0609020204030204" pitchFamily="49" charset="0"/>
+              </a:rPr>
+              <a:t>Program.cpp</a:t>
+            </a:r>
+            <a:r>
               <a:rPr lang="en-US" dirty="0"/>
-              <a:t>Program.cpp </a:t>
+              <a:t> </a:t>
             </a:r>
             <a:r>
               <a:rPr lang="bg-BG" dirty="0"/>
               <a:t>се компилира до </a:t>
             </a:r>
             <a:r>
-              <a:rPr lang="sv-SE" dirty="0"/>
+              <a:rPr lang="sv-SE" b="1" dirty="0">
+                <a:solidFill>
+                  <a:schemeClr val="tx2">
+                    <a:lumMod val="75000"/>
+                  </a:schemeClr>
+                </a:solidFill>
+                <a:latin typeface="Consolas" panose="020B0609020204030204" pitchFamily="49" charset="0"/>
+              </a:rPr>
               <a:t>Program.exe</a:t>
             </a:r>
           </a:p>
@@ -10413,11 +10937,15 @@
                   </a:schemeClr>
                 </a:solidFill>
               </a:rPr>
-              <a:t>интерпретира </a:t>
+              <a:t>интерпретира</a:t>
+            </a:r>
+            <a:r>
+              <a:rPr lang="en-US" dirty="0"/>
+              <a:t>, </a:t>
             </a:r>
             <a:r>
               <a:rPr lang="bg-BG" dirty="0"/>
-              <a:t>(изпълнява  се директно)</a:t>
+              <a:t>т.е. изпълнява  се директно</a:t>
             </a:r>
             <a:endParaRPr lang="bg-BG" dirty="0">
               <a:solidFill>
@@ -10508,8 +11036,8 @@
         </p:nvSpPr>
         <p:spPr>
           <a:xfrm>
-            <a:off x="912813" y="4114800"/>
-            <a:ext cx="10363200" cy="820600"/>
+            <a:off x="394653" y="5427800"/>
+            <a:ext cx="11399520" cy="820600"/>
           </a:xfrm>
         </p:spPr>
         <p:txBody>
@@ -10540,8 +11068,8 @@
         </p:blipFill>
         <p:spPr>
           <a:xfrm>
-            <a:off x="3427412" y="1447800"/>
-            <a:ext cx="4261867" cy="2364303"/>
+            <a:off x="2662523" y="1295400"/>
+            <a:ext cx="6863780" cy="3807734"/>
           </a:xfrm>
           <a:prstGeom prst="rect">
             <a:avLst/>
@@ -10689,7 +11217,7 @@
               <a:t> </a:t>
             </a:r>
             <a:r>
-              <a:rPr lang="en-US" dirty="0" err="1">
+              <a:rPr lang="en-US" noProof="1">
                 <a:sym typeface="Wingdings" panose="05000000000000000000" pitchFamily="2" charset="2"/>
               </a:rPr>
               <a:t>PyCharm</a:t>
@@ -10720,19 +11248,7 @@
               <a:rPr lang="en-US" dirty="0">
                 <a:sym typeface="Wingdings" panose="05000000000000000000" pitchFamily="2" charset="2"/>
               </a:rPr>
-              <a:t>Java  </a:t>
-            </a:r>
-            <a:r>
-              <a:rPr lang="en-US" dirty="0" err="1">
-                <a:sym typeface="Wingdings" panose="05000000000000000000" pitchFamily="2" charset="2"/>
-              </a:rPr>
-              <a:t>IntellyJ</a:t>
-            </a:r>
-            <a:r>
-              <a:rPr lang="en-US" dirty="0">
-                <a:sym typeface="Wingdings" panose="05000000000000000000" pitchFamily="2" charset="2"/>
-              </a:rPr>
-              <a:t> Idea; </a:t>
+              <a:t>Java  IntelliJ Idea; </a:t>
             </a:r>
             <a:r>
               <a:rPr lang="bg-BG" dirty="0">
@@ -10744,11 +11260,22 @@
               <a:rPr lang="en-US" dirty="0">
                 <a:sym typeface="Wingdings" panose="05000000000000000000" pitchFamily="2" charset="2"/>
               </a:rPr>
-              <a:t>PHP  PHP Storm</a:t>
+              <a:t>PHP  </a:t>
+            </a:r>
+            <a:r>
+              <a:rPr lang="en-US" dirty="0" err="1">
+                <a:sym typeface="Wingdings" panose="05000000000000000000" pitchFamily="2" charset="2"/>
+              </a:rPr>
+              <a:t>PhpStorm</a:t>
             </a:r>
             <a:endParaRPr lang="bg-BG" dirty="0"/>
           </a:p>
           <a:p>
+            <a:pPr>
+              <a:spcBef>
+                <a:spcPts val="1800"/>
+              </a:spcBef>
+            </a:pPr>
             <a:r>
               <a:rPr lang="bg-BG" dirty="0"/>
               <a:t>Инсталирайте си </a:t>
@@ -10765,19 +11292,7 @@
             </a:r>
           </a:p>
           <a:p>
-            <a:pPr marL="0" indent="0">
-              <a:buNone/>
-            </a:pPr>
-            <a:r>
-              <a:rPr lang="en-US" b="1" dirty="0">
-                <a:solidFill>
-                  <a:schemeClr val="tx2">
-                    <a:lumMod val="75000"/>
-                  </a:schemeClr>
-                </a:solidFill>
-              </a:rPr>
-              <a:t> </a:t>
-            </a:r>
+            <a:pPr lvl="1"/>
             <a:r>
               <a:rPr lang="en-US" dirty="0">
                 <a:hlinkClick r:id="rId2"/>
@@ -10787,27 +11302,17 @@
             <a:endParaRPr lang="en-US" dirty="0"/>
           </a:p>
           <a:p>
-            <a:pPr marL="0" indent="0">
-              <a:buNone/>
-            </a:pPr>
+            <a:pPr lvl="1"/>
             <a:r>
               <a:rPr lang="bg-BG" dirty="0"/>
-              <a:t>Важно е да изтеглите версия на </a:t>
-            </a:r>
-            <a:r>
-              <a:rPr lang="en-US" dirty="0"/>
-              <a:t>Code::Blocks </a:t>
+              <a:t>Изтеглете версия с включен </a:t>
+            </a:r>
+            <a:r>
+              <a:rPr lang="en-US" noProof="1"/>
+              <a:t>MinGW</a:t>
             </a:r>
             <a:r>
               <a:rPr lang="bg-BG" dirty="0"/>
-              <a:t>с включен </a:t>
-            </a:r>
-            <a:r>
-              <a:rPr lang="en-US" dirty="0" err="1"/>
-              <a:t>MinGW</a:t>
-            </a:r>
-            <a:r>
-              <a:rPr lang="bg-BG"/>
               <a:t> компилатор!</a:t>
             </a:r>
             <a:endParaRPr lang="en-US" dirty="0"/>
@@ -11059,7 +11564,7 @@
         </p:blipFill>
         <p:spPr>
           <a:xfrm rot="1479948">
-            <a:off x="7308799" y="1056256"/>
+            <a:off x="7190868" y="1056256"/>
             <a:ext cx="3886200" cy="4643619"/>
           </a:xfrm>
           <a:prstGeom prst="rect">
@@ -11083,7 +11588,7 @@
         </p:blipFill>
         <p:spPr>
           <a:xfrm rot="20260835">
-            <a:off x="7125585" y="3634007"/>
+            <a:off x="7007654" y="3575021"/>
             <a:ext cx="3261208" cy="2462212"/>
           </a:xfrm>
           <a:prstGeom prst="rect">

</xml_diff>

<commit_message>
fix hyperlinks in first 4 lectures
</commit_message>
<xml_diff>
--- a/1. First-Steps-in-Coding/1. First-Steps-in-Coding.pptx
+++ b/1. First-Steps-in-Coding/1. First-Steps-in-Coding.pptx
@@ -130,7 +130,7 @@
   </p:defaultTextStyle>
   <p:extLst>
     <p:ext uri="{EFAFB233-063F-42B5-8137-9DF3F51BA10A}">
-      <p15:sldGuideLst xmlns:p15="http://schemas.microsoft.com/office/powerpoint/2012/main">
+      <p15:sldGuideLst xmlns:p15="http://schemas.microsoft.com/office/powerpoint/2012/main" xmlns="">
         <p15:guide id="1" orient="horz" pos="2160" userDrawn="1">
           <p15:clr>
             <a:srgbClr val="A4A3A4"/>
@@ -144,7 +144,7 @@
       </p15:sldGuideLst>
     </p:ext>
     <p:ext uri="{2D200454-40CA-4A62-9FC3-DE9A4176ACB9}">
-      <p15:notesGuideLst xmlns:p15="http://schemas.microsoft.com/office/powerpoint/2012/main">
+      <p15:notesGuideLst xmlns:p15="http://schemas.microsoft.com/office/powerpoint/2012/main" xmlns="">
         <p15:guide id="1" orient="horz" pos="2880">
           <p15:clr>
             <a:srgbClr val="A4A3A4"/>
@@ -244,7 +244,7 @@
             <a:fld id="{FE5B4EDC-59C0-49C7-8ADA-5A781B329E02}" type="datetimeFigureOut">
               <a:rPr lang="en-US"/>
               <a:pPr/>
-              <a:t>4/8/2017</a:t>
+              <a:t>5/17/2017</a:t>
             </a:fld>
             <a:endParaRPr dirty="0"/>
           </a:p>
@@ -443,7 +443,7 @@
             <a:fld id="{F2D8D46A-B586-417D-BFBD-8C8FE0AAF762}" type="datetimeFigureOut">
               <a:rPr lang="en-US" smtClean="0"/>
               <a:pPr/>
-              <a:t>4/8/2017</a:t>
+              <a:t>5/17/2017</a:t>
             </a:fld>
             <a:endParaRPr lang="en-US"/>
           </a:p>
@@ -2578,7 +2578,7 @@
             <a:fld id="{055373AC-9AA7-423B-BA00-BA1C74164DBD}" type="datetime1">
               <a:rPr lang="en-US" smtClean="0"/>
               <a:pPr/>
-              <a:t>4/8/2017</a:t>
+              <a:t>5/17/2017</a:t>
             </a:fld>
             <a:endParaRPr lang="en-US" dirty="0"/>
           </a:p>
@@ -3679,7 +3679,7 @@
                 </a:solidFill>
               </a:rPr>
               <a:pPr/>
-              <a:t>4/8/2017</a:t>
+              <a:t>5/17/2017</a:t>
             </a:fld>
             <a:endParaRPr lang="en-US" dirty="0">
               <a:solidFill>
@@ -4855,7 +4855,7 @@
             <a:fld id="{055373AC-9AA7-423B-BA00-BA1C74164DBD}" type="datetime1">
               <a:rPr lang="en-US" smtClean="0"/>
               <a:pPr/>
-              <a:t>4/8/2017</a:t>
+              <a:t>5/17/2017</a:t>
             </a:fld>
             <a:endParaRPr lang="en-US" dirty="0"/>
           </a:p>
@@ -5383,7 +5383,7 @@
   </p:txStyles>
   <p:extLst mod="1">
     <p:ext uri="{27BBF7A9-308A-43DC-89C8-2F10F3537804}">
-      <p15:sldGuideLst xmlns:p15="http://schemas.microsoft.com/office/powerpoint/2012/main">
+      <p15:sldGuideLst xmlns:p15="http://schemas.microsoft.com/office/powerpoint/2012/main" xmlns="">
         <p15:guide id="1" orient="horz" pos="2160" userDrawn="1">
           <p15:clr>
             <a:srgbClr val="F26B43"/>
@@ -5473,7 +5473,7 @@
                 </a:solidFill>
               </a:rPr>
               <a:pPr/>
-              <a:t>4/8/2017</a:t>
+              <a:t>5/17/2017</a:t>
             </a:fld>
             <a:endParaRPr lang="en-US" dirty="0">
               <a:solidFill>
@@ -6026,7 +6026,7 @@
   </p:txStyles>
   <p:extLst mod="1">
     <p:ext uri="{27BBF7A9-308A-43DC-89C8-2F10F3537804}">
-      <p15:sldGuideLst xmlns:p15="http://schemas.microsoft.com/office/powerpoint/2012/main">
+      <p15:sldGuideLst xmlns:p15="http://schemas.microsoft.com/office/powerpoint/2012/main" xmlns="">
         <p15:guide id="1" orient="horz" pos="2160" userDrawn="1">
           <p15:clr>
             <a:srgbClr val="F26B43"/>
@@ -7359,7 +7359,23 @@
               <a:rPr lang="en-US" dirty="0">
                 <a:hlinkClick r:id="rId2"/>
               </a:rPr>
-              <a:t>https://judge.softuni.bg/Contests/150/First-Steps-in-Coding</a:t>
+              <a:t>https://</a:t>
+            </a:r>
+            <a:r>
+              <a:rPr lang="en-US" dirty="0" smtClean="0">
+                <a:hlinkClick r:id="rId2"/>
+              </a:rPr>
+              <a:t>judge.softuni.bg/Contests/528/</a:t>
+            </a:r>
+            <a:r>
+              <a:rPr lang="bg-BG" dirty="0" smtClean="0">
+                <a:hlinkClick r:id="rId2"/>
+              </a:rPr>
+              <a:t>Първи-стъпки-в-програмирането</a:t>
+            </a:r>
+            <a:r>
+              <a:rPr lang="en-US" dirty="0" smtClean="0"/>
+              <a:t> </a:t>
             </a:r>
             <a:endParaRPr lang="en-US" dirty="0"/>
           </a:p>
@@ -7412,7 +7428,7 @@
         </p:blipFill>
         <p:spPr>
           <a:xfrm>
-            <a:off x="1598612" y="2438400"/>
+            <a:off x="1598612" y="2895600"/>
             <a:ext cx="8649452" cy="3581400"/>
           </a:xfrm>
           <a:prstGeom prst="rect">

</xml_diff>